<commit_message>
updated fig 7 and 8
</commit_message>
<xml_diff>
--- a/assembly/pictures/Maxcycplot.pptx
+++ b/assembly/pictures/Maxcycplot.pptx
@@ -106,7 +106,7 @@
   </p:defaultTextStyle>
   <p:extLst>
     <p:ext uri="{EFAFB233-063F-42B5-8137-9DF3F51BA10A}">
-      <p15:sldGuideLst xmlns:p15="http://schemas.microsoft.com/office/powerpoint/2012/main"/>
+      <p15:sldGuideLst xmlns:p15="http://schemas.microsoft.com/office/powerpoint/2012/main" xmlns=""/>
     </p:ext>
   </p:extLst>
 </p:presentation>
@@ -245,7 +245,7 @@
           <a:p>
             <a:fld id="{3BE795B5-8F7C-44FC-B6A9-25A6048D9BDE}" type="datetimeFigureOut">
               <a:rPr lang="en-US" smtClean="0"/>
-              <a:t>5/2/2017</a:t>
+              <a:t>5/3/17</a:t>
             </a:fld>
             <a:endParaRPr lang="en-US"/>
           </a:p>
@@ -413,7 +413,7 @@
           <a:p>
             <a:fld id="{3BE795B5-8F7C-44FC-B6A9-25A6048D9BDE}" type="datetimeFigureOut">
               <a:rPr lang="en-US" smtClean="0"/>
-              <a:t>5/2/2017</a:t>
+              <a:t>5/3/17</a:t>
             </a:fld>
             <a:endParaRPr lang="en-US"/>
           </a:p>
@@ -591,7 +591,7 @@
           <a:p>
             <a:fld id="{3BE795B5-8F7C-44FC-B6A9-25A6048D9BDE}" type="datetimeFigureOut">
               <a:rPr lang="en-US" smtClean="0"/>
-              <a:t>5/2/2017</a:t>
+              <a:t>5/3/17</a:t>
             </a:fld>
             <a:endParaRPr lang="en-US"/>
           </a:p>
@@ -759,7 +759,7 @@
           <a:p>
             <a:fld id="{3BE795B5-8F7C-44FC-B6A9-25A6048D9BDE}" type="datetimeFigureOut">
               <a:rPr lang="en-US" smtClean="0"/>
-              <a:t>5/2/2017</a:t>
+              <a:t>5/3/17</a:t>
             </a:fld>
             <a:endParaRPr lang="en-US"/>
           </a:p>
@@ -1004,7 +1004,7 @@
           <a:p>
             <a:fld id="{3BE795B5-8F7C-44FC-B6A9-25A6048D9BDE}" type="datetimeFigureOut">
               <a:rPr lang="en-US" smtClean="0"/>
-              <a:t>5/2/2017</a:t>
+              <a:t>5/3/17</a:t>
             </a:fld>
             <a:endParaRPr lang="en-US"/>
           </a:p>
@@ -1233,7 +1233,7 @@
           <a:p>
             <a:fld id="{3BE795B5-8F7C-44FC-B6A9-25A6048D9BDE}" type="datetimeFigureOut">
               <a:rPr lang="en-US" smtClean="0"/>
-              <a:t>5/2/2017</a:t>
+              <a:t>5/3/17</a:t>
             </a:fld>
             <a:endParaRPr lang="en-US"/>
           </a:p>
@@ -1597,7 +1597,7 @@
           <a:p>
             <a:fld id="{3BE795B5-8F7C-44FC-B6A9-25A6048D9BDE}" type="datetimeFigureOut">
               <a:rPr lang="en-US" smtClean="0"/>
-              <a:t>5/2/2017</a:t>
+              <a:t>5/3/17</a:t>
             </a:fld>
             <a:endParaRPr lang="en-US"/>
           </a:p>
@@ -1714,7 +1714,7 @@
           <a:p>
             <a:fld id="{3BE795B5-8F7C-44FC-B6A9-25A6048D9BDE}" type="datetimeFigureOut">
               <a:rPr lang="en-US" smtClean="0"/>
-              <a:t>5/2/2017</a:t>
+              <a:t>5/3/17</a:t>
             </a:fld>
             <a:endParaRPr lang="en-US"/>
           </a:p>
@@ -1809,7 +1809,7 @@
           <a:p>
             <a:fld id="{3BE795B5-8F7C-44FC-B6A9-25A6048D9BDE}" type="datetimeFigureOut">
               <a:rPr lang="en-US" smtClean="0"/>
-              <a:t>5/2/2017</a:t>
+              <a:t>5/3/17</a:t>
             </a:fld>
             <a:endParaRPr lang="en-US"/>
           </a:p>
@@ -2084,7 +2084,7 @@
           <a:p>
             <a:fld id="{3BE795B5-8F7C-44FC-B6A9-25A6048D9BDE}" type="datetimeFigureOut">
               <a:rPr lang="en-US" smtClean="0"/>
-              <a:t>5/2/2017</a:t>
+              <a:t>5/3/17</a:t>
             </a:fld>
             <a:endParaRPr lang="en-US"/>
           </a:p>
@@ -2336,7 +2336,7 @@
           <a:p>
             <a:fld id="{3BE795B5-8F7C-44FC-B6A9-25A6048D9BDE}" type="datetimeFigureOut">
               <a:rPr lang="en-US" smtClean="0"/>
-              <a:t>5/2/2017</a:t>
+              <a:t>5/3/17</a:t>
             </a:fld>
             <a:endParaRPr lang="en-US"/>
           </a:p>
@@ -2547,7 +2547,7 @@
           <a:p>
             <a:fld id="{3BE795B5-8F7C-44FC-B6A9-25A6048D9BDE}" type="datetimeFigureOut">
               <a:rPr lang="en-US" smtClean="0"/>
-              <a:t>5/2/2017</a:t>
+              <a:t>5/3/17</a:t>
             </a:fld>
             <a:endParaRPr lang="en-US"/>
           </a:p>
@@ -2954,7 +2954,7 @@
       </p:grpSpPr>
       <p:pic>
         <p:nvPicPr>
-          <p:cNvPr id="2" name="Picture 1"/>
+          <p:cNvPr id="7" name="Picture 6"/>
           <p:cNvPicPr>
             <a:picLocks noChangeAspect="1"/>
           </p:cNvPicPr>
@@ -2968,8 +2968,8 @@
         </p:blipFill>
         <p:spPr>
           <a:xfrm>
-            <a:off x="3557551" y="1552438"/>
-            <a:ext cx="5076897" cy="3819375"/>
+            <a:off x="9884644" y="1371645"/>
+            <a:ext cx="1934039" cy="1408744"/>
           </a:xfrm>
           <a:prstGeom prst="rect">
             <a:avLst/>
@@ -2991,9 +2991,9 @@
           </a:stretch>
         </p:blipFill>
         <p:spPr>
-          <a:xfrm rot="19397689">
-            <a:off x="4396225" y="3983064"/>
-            <a:ext cx="249958" cy="249958"/>
+          <a:xfrm>
+            <a:off x="1700075" y="3445326"/>
+            <a:ext cx="874604" cy="874604"/>
           </a:xfrm>
           <a:prstGeom prst="rect">
             <a:avLst/>
@@ -3015,9 +3015,9 @@
           </a:stretch>
         </p:blipFill>
         <p:spPr>
-          <a:xfrm rot="19437280">
-            <a:off x="4640468" y="3711428"/>
-            <a:ext cx="298730" cy="341406"/>
+          <a:xfrm>
+            <a:off x="2654845" y="2765639"/>
+            <a:ext cx="1045257" cy="1194580"/>
           </a:xfrm>
           <a:prstGeom prst="rect">
             <a:avLst/>
@@ -3039,9 +3039,9 @@
           </a:stretch>
         </p:blipFill>
         <p:spPr>
-          <a:xfrm rot="19132038">
-            <a:off x="4908162" y="3564625"/>
-            <a:ext cx="396274" cy="225572"/>
+          <a:xfrm>
+            <a:off x="3844574" y="2487765"/>
+            <a:ext cx="1386564" cy="789277"/>
           </a:xfrm>
           <a:prstGeom prst="rect">
             <a:avLst/>
@@ -3063,9 +3063,9 @@
           </a:stretch>
         </p:blipFill>
         <p:spPr>
-          <a:xfrm rot="19308477">
-            <a:off x="5997350" y="2558579"/>
-            <a:ext cx="415802" cy="407728"/>
+          <a:xfrm>
+            <a:off x="8458972" y="2113630"/>
+            <a:ext cx="1454893" cy="1426642"/>
           </a:xfrm>
           <a:prstGeom prst="rect">
             <a:avLst/>
@@ -3074,22 +3074,28 @@
       </p:pic>
       <p:pic>
         <p:nvPicPr>
-          <p:cNvPr id="7" name="Picture 6"/>
+          <p:cNvPr id="10" name="Picture 9" descr="MaxCycleBlank.pdf"/>
           <p:cNvPicPr>
             <a:picLocks noChangeAspect="1"/>
           </p:cNvPicPr>
           <p:nvPr/>
         </p:nvPicPr>
         <p:blipFill>
-          <a:blip r:embed="rId7"/>
+          <a:blip r:embed="rId7">
+            <a:extLst>
+              <a:ext uri="{28A0092B-C50C-407E-A947-70E740481C1C}">
+                <a14:useLocalDpi xmlns:a14="http://schemas.microsoft.com/office/drawing/2010/main" val="0"/>
+              </a:ext>
+            </a:extLst>
+          </a:blip>
           <a:stretch>
             <a:fillRect/>
           </a:stretch>
         </p:blipFill>
         <p:spPr>
-          <a:xfrm rot="19474257">
-            <a:off x="6478912" y="2140736"/>
-            <a:ext cx="552740" cy="402613"/>
+          <a:xfrm>
+            <a:off x="-347691" y="-121497"/>
+            <a:ext cx="13486551" cy="6743276"/>
           </a:xfrm>
           <a:prstGeom prst="rect">
             <a:avLst/>
@@ -3098,7 +3104,7 @@
       </p:pic>
       <p:cxnSp>
         <p:nvCxnSpPr>
-          <p:cNvPr id="9" name="Straight Arrow Connector 8"/>
+          <p:cNvPr id="22" name="Straight Arrow Connector 21"/>
           <p:cNvCxnSpPr>
             <a:cxnSpLocks/>
           </p:cNvCxnSpPr>
@@ -3106,14 +3112,14 @@
         </p:nvCxnSpPr>
         <p:spPr>
           <a:xfrm flipH="1" flipV="1">
-            <a:off x="4669419" y="4199742"/>
-            <a:ext cx="240828" cy="324838"/>
+            <a:off x="2582333" y="4318000"/>
+            <a:ext cx="776817" cy="841375"/>
           </a:xfrm>
           <a:prstGeom prst="straightConnector1">
             <a:avLst/>
           </a:prstGeom>
-          <a:ln>
-            <a:tailEnd type="triangle"/>
+          <a:ln w="50800" cap="rnd">
+            <a:tailEnd type="stealth" w="med" len="lg"/>
           </a:ln>
         </p:spPr>
         <p:style>
@@ -3133,7 +3139,7 @@
       </p:cxnSp>
       <p:cxnSp>
         <p:nvCxnSpPr>
-          <p:cNvPr id="16" name="Straight Arrow Connector 15"/>
+          <p:cNvPr id="32" name="Straight Arrow Connector 31"/>
           <p:cNvCxnSpPr>
             <a:cxnSpLocks/>
           </p:cNvCxnSpPr>
@@ -3141,14 +3147,14 @@
         </p:nvCxnSpPr>
         <p:spPr>
           <a:xfrm flipH="1" flipV="1">
-            <a:off x="5184899" y="3766432"/>
-            <a:ext cx="326277" cy="491588"/>
+            <a:off x="3445933" y="3852333"/>
+            <a:ext cx="618067" cy="1186392"/>
           </a:xfrm>
           <a:prstGeom prst="straightConnector1">
             <a:avLst/>
           </a:prstGeom>
-          <a:ln>
-            <a:tailEnd type="triangle"/>
+          <a:ln w="50800" cap="rnd">
+            <a:tailEnd type="stealth" w="med" len="lg"/>
           </a:ln>
         </p:spPr>
         <p:style>
@@ -3168,7 +3174,7 @@
       </p:cxnSp>
       <p:cxnSp>
         <p:nvCxnSpPr>
-          <p:cNvPr id="19" name="Straight Arrow Connector 18"/>
+          <p:cNvPr id="33" name="Straight Arrow Connector 32"/>
           <p:cNvCxnSpPr>
             <a:cxnSpLocks/>
           </p:cNvCxnSpPr>
@@ -3176,14 +3182,14 @@
         </p:nvCxnSpPr>
         <p:spPr>
           <a:xfrm flipH="1" flipV="1">
-            <a:off x="6250252" y="3015498"/>
-            <a:ext cx="538212" cy="710196"/>
+            <a:off x="4529667" y="3386667"/>
+            <a:ext cx="420158" cy="1305983"/>
           </a:xfrm>
           <a:prstGeom prst="straightConnector1">
             <a:avLst/>
           </a:prstGeom>
-          <a:ln>
-            <a:tailEnd type="triangle"/>
+          <a:ln w="50800" cap="rnd">
+            <a:tailEnd type="stealth" w="med" len="lg"/>
           </a:ln>
         </p:spPr>
         <p:style>
@@ -3203,22 +3209,22 @@
       </p:cxnSp>
       <p:cxnSp>
         <p:nvCxnSpPr>
-          <p:cNvPr id="21" name="Straight Arrow Connector 20"/>
+          <p:cNvPr id="34" name="Straight Arrow Connector 33"/>
           <p:cNvCxnSpPr>
             <a:cxnSpLocks/>
           </p:cNvCxnSpPr>
           <p:nvPr/>
         </p:nvCxnSpPr>
         <p:spPr>
-          <a:xfrm flipH="1" flipV="1">
-            <a:off x="6809974" y="2547697"/>
-            <a:ext cx="616456" cy="843268"/>
+          <a:xfrm flipV="1">
+            <a:off x="8314267" y="3488267"/>
+            <a:ext cx="237066" cy="288924"/>
           </a:xfrm>
           <a:prstGeom prst="straightConnector1">
             <a:avLst/>
           </a:prstGeom>
-          <a:ln>
-            <a:tailEnd type="triangle"/>
+          <a:ln w="50800" cap="rnd">
+            <a:tailEnd type="stealth" w="med" len="lg"/>
           </a:ln>
         </p:spPr>
         <p:style>
@@ -3238,22 +3244,22 @@
       </p:cxnSp>
       <p:cxnSp>
         <p:nvCxnSpPr>
-          <p:cNvPr id="17" name="Straight Arrow Connector 16"/>
+          <p:cNvPr id="35" name="Straight Arrow Connector 34"/>
           <p:cNvCxnSpPr>
             <a:cxnSpLocks/>
           </p:cNvCxnSpPr>
           <p:nvPr/>
         </p:nvCxnSpPr>
         <p:spPr>
-          <a:xfrm flipH="1" flipV="1">
-            <a:off x="4853582" y="4032390"/>
-            <a:ext cx="331317" cy="437445"/>
+          <a:xfrm flipV="1">
+            <a:off x="10083799" y="2726267"/>
+            <a:ext cx="389468" cy="475191"/>
           </a:xfrm>
           <a:prstGeom prst="straightConnector1">
             <a:avLst/>
           </a:prstGeom>
-          <a:ln>
-            <a:tailEnd type="triangle"/>
+          <a:ln w="50800" cap="rnd">
+            <a:tailEnd type="stealth" w="med" len="lg"/>
           </a:ln>
         </p:spPr>
         <p:style>
@@ -3327,7 +3333,7 @@
     </a:clrScheme>
     <a:fontScheme name="Office">
       <a:majorFont>
-        <a:latin typeface="Calibri Light" panose="020F0302020204030204"/>
+        <a:latin typeface="Calibri Light"/>
         <a:ea typeface=""/>
         <a:cs typeface=""/>
         <a:font script="Jpan" typeface="游ゴシック Light"/>
@@ -3379,7 +3385,7 @@
         <a:font script="Tfng" typeface="Ebrima"/>
       </a:majorFont>
       <a:minorFont>
-        <a:latin typeface="Calibri" panose="020F0502020204030204"/>
+        <a:latin typeface="Calibri"/>
         <a:ea typeface=""/>
         <a:cs typeface=""/>
         <a:font script="Jpan" typeface="游ゴシック"/>
@@ -3573,7 +3579,7 @@
   <a:extraClrSchemeLst/>
   <a:extLst>
     <a:ext uri="{05A4C25C-085E-4340-85A3-A5531E510DB2}">
-      <thm15:themeFamily xmlns:thm15="http://schemas.microsoft.com/office/thememl/2012/main" name="Office Theme" id="{62F939B6-93AF-4DB8-9C6B-D6C7DFDC589F}" vid="{4A3C46E8-61CC-4603-A589-7422A47A8E4A}"/>
+      <thm15:themeFamily xmlns:thm15="http://schemas.microsoft.com/office/thememl/2012/main" xmlns="" name="Office Theme" id="{62F939B6-93AF-4DB8-9C6B-D6C7DFDC589F}" vid="{4A3C46E8-61CC-4603-A589-7422A47A8E4A}"/>
     </a:ext>
   </a:extLst>
 </a:theme>

</xml_diff>